<commit_message>
added 16 and 17
</commit_message>
<xml_diff>
--- a/content/15-cloud-and-devops.pptx
+++ b/content/15-cloud-and-devops.pptx
@@ -5,21 +5,20 @@
     <p:sldMasterId id="2147483696" r:id="rId1"/>
   </p:sldMasterIdLst>
   <p:notesMasterIdLst>
-    <p:notesMasterId r:id="rId14"/>
+    <p:notesMasterId r:id="rId13"/>
   </p:notesMasterIdLst>
   <p:sldIdLst>
     <p:sldId id="297" r:id="rId2"/>
     <p:sldId id="289" r:id="rId3"/>
     <p:sldId id="258" r:id="rId4"/>
     <p:sldId id="298" r:id="rId5"/>
-    <p:sldId id="296" r:id="rId6"/>
-    <p:sldId id="302" r:id="rId7"/>
-    <p:sldId id="312" r:id="rId8"/>
-    <p:sldId id="291" r:id="rId9"/>
-    <p:sldId id="294" r:id="rId10"/>
-    <p:sldId id="292" r:id="rId11"/>
-    <p:sldId id="301" r:id="rId12"/>
-    <p:sldId id="283" r:id="rId13"/>
+    <p:sldId id="302" r:id="rId6"/>
+    <p:sldId id="312" r:id="rId7"/>
+    <p:sldId id="291" r:id="rId8"/>
+    <p:sldId id="294" r:id="rId9"/>
+    <p:sldId id="292" r:id="rId10"/>
+    <p:sldId id="301" r:id="rId11"/>
+    <p:sldId id="283" r:id="rId12"/>
   </p:sldIdLst>
   <p:sldSz cx="12192000" cy="6858000"/>
   <p:notesSz cx="6858000" cy="9144000"/>
@@ -131,7 +130,6 @@
         </p14:section>
         <p14:section name="Content" id="{2C67B003-B916-43D3-BE5B-B3D36B8F4E1C}">
           <p14:sldIdLst>
-            <p14:sldId id="296"/>
             <p14:sldId id="302"/>
             <p14:sldId id="312"/>
             <p14:sldId id="291"/>
@@ -236,7 +234,7 @@
           <a:p>
             <a:fld id="{7BCB8214-0E7E-4EFC-9E1C-25F6159D4170}" type="datetimeFigureOut">
               <a:rPr lang="en-US" smtClean="0"/>
-              <a:t>10/21/2018</a:t>
+              <a:t>10/25/2018</a:t>
             </a:fld>
             <a:endParaRPr lang="en-US"/>
           </a:p>
@@ -678,7 +676,7 @@
           <a:p>
             <a:fld id="{0112F830-31CF-4898-9DC8-86941997CB87}" type="slidenum">
               <a:rPr lang="en-US" smtClean="0"/>
-              <a:t>10</a:t>
+              <a:t>9</a:t>
             </a:fld>
             <a:endParaRPr lang="en-US"/>
           </a:p>
@@ -828,7 +826,7 @@
           <a:p>
             <a:fld id="{C8AC65AB-5746-43EA-A59E-648FB11CA309}" type="datetimeFigureOut">
               <a:rPr lang="en-US" smtClean="0"/>
-              <a:t>10/21/2018</a:t>
+              <a:t>10/25/2018</a:t>
             </a:fld>
             <a:endParaRPr lang="en-US"/>
           </a:p>
@@ -998,7 +996,7 @@
           <a:p>
             <a:fld id="{C8AC65AB-5746-43EA-A59E-648FB11CA309}" type="datetimeFigureOut">
               <a:rPr lang="en-US" smtClean="0"/>
-              <a:t>10/21/2018</a:t>
+              <a:t>10/25/2018</a:t>
             </a:fld>
             <a:endParaRPr lang="en-US"/>
           </a:p>
@@ -1178,7 +1176,7 @@
           <a:p>
             <a:fld id="{C8AC65AB-5746-43EA-A59E-648FB11CA309}" type="datetimeFigureOut">
               <a:rPr lang="en-US" smtClean="0"/>
-              <a:t>10/21/2018</a:t>
+              <a:t>10/25/2018</a:t>
             </a:fld>
             <a:endParaRPr lang="en-US"/>
           </a:p>
@@ -1370,7 +1368,7 @@
           <a:p>
             <a:fld id="{C8AC65AB-5746-43EA-A59E-648FB11CA309}" type="datetimeFigureOut">
               <a:rPr lang="en-US" smtClean="0"/>
-              <a:t>10/21/2018</a:t>
+              <a:t>10/25/2018</a:t>
             </a:fld>
             <a:endParaRPr lang="en-US"/>
           </a:p>
@@ -1615,7 +1613,7 @@
           <a:p>
             <a:fld id="{C8AC65AB-5746-43EA-A59E-648FB11CA309}" type="datetimeFigureOut">
               <a:rPr lang="en-US" smtClean="0"/>
-              <a:t>10/21/2018</a:t>
+              <a:t>10/25/2018</a:t>
             </a:fld>
             <a:endParaRPr lang="en-US"/>
           </a:p>
@@ -1852,7 +1850,7 @@
           <a:p>
             <a:fld id="{C8AC65AB-5746-43EA-A59E-648FB11CA309}" type="datetimeFigureOut">
               <a:rPr lang="en-US" smtClean="0"/>
-              <a:t>10/21/2018</a:t>
+              <a:t>10/25/2018</a:t>
             </a:fld>
             <a:endParaRPr lang="en-US"/>
           </a:p>
@@ -2228,7 +2226,7 @@
           <a:p>
             <a:fld id="{C8AC65AB-5746-43EA-A59E-648FB11CA309}" type="datetimeFigureOut">
               <a:rPr lang="en-US" smtClean="0"/>
-              <a:t>10/21/2018</a:t>
+              <a:t>10/25/2018</a:t>
             </a:fld>
             <a:endParaRPr lang="en-US"/>
           </a:p>
@@ -2351,7 +2349,7 @@
           <a:p>
             <a:fld id="{C8AC65AB-5746-43EA-A59E-648FB11CA309}" type="datetimeFigureOut">
               <a:rPr lang="en-US" smtClean="0"/>
-              <a:t>10/21/2018</a:t>
+              <a:t>10/25/2018</a:t>
             </a:fld>
             <a:endParaRPr lang="en-US"/>
           </a:p>
@@ -2446,7 +2444,7 @@
           <a:p>
             <a:fld id="{C8AC65AB-5746-43EA-A59E-648FB11CA309}" type="datetimeFigureOut">
               <a:rPr lang="en-US" smtClean="0"/>
-              <a:t>10/21/2018</a:t>
+              <a:t>10/25/2018</a:t>
             </a:fld>
             <a:endParaRPr lang="en-US"/>
           </a:p>
@@ -2723,7 +2721,7 @@
           <a:p>
             <a:fld id="{C8AC65AB-5746-43EA-A59E-648FB11CA309}" type="datetimeFigureOut">
               <a:rPr lang="en-US" smtClean="0"/>
-              <a:t>10/21/2018</a:t>
+              <a:t>10/25/2018</a:t>
             </a:fld>
             <a:endParaRPr lang="en-US"/>
           </a:p>
@@ -2980,7 +2978,7 @@
           <a:p>
             <a:fld id="{C8AC65AB-5746-43EA-A59E-648FB11CA309}" type="datetimeFigureOut">
               <a:rPr lang="en-US" smtClean="0"/>
-              <a:t>10/21/2018</a:t>
+              <a:t>10/25/2018</a:t>
             </a:fld>
             <a:endParaRPr lang="en-US"/>
           </a:p>
@@ -3193,7 +3191,7 @@
           <a:p>
             <a:fld id="{C8AC65AB-5746-43EA-A59E-648FB11CA309}" type="datetimeFigureOut">
               <a:rPr lang="en-US" smtClean="0"/>
-              <a:t>10/21/2018</a:t>
+              <a:t>10/25/2018</a:t>
             </a:fld>
             <a:endParaRPr lang="en-US"/>
           </a:p>
@@ -3614,7 +3612,7 @@
                 <a16:creationId xmlns:a16="http://schemas.microsoft.com/office/drawing/2014/main" id="{6753252F-4873-4F63-801D-CC719279A7D5}"/>
               </a:ext>
               <a:ext uri="{C183D7F6-B498-43B3-948B-1728B52AA6E4}">
-                <adec:decorative xmlns:adec="http://schemas.microsoft.com/office/drawing/2017/decorative" val="1"/>
+                <adec:decorative xmlns:adec="http://schemas.microsoft.com/office/drawing/2017/decorative" xmlns="" val="1"/>
               </a:ext>
             </a:extLst>
           </p:cNvPr>
@@ -3706,7 +3704,7 @@
                 <a16:creationId xmlns:a16="http://schemas.microsoft.com/office/drawing/2014/main" id="{047C8CCB-F95D-4249-92DD-651249D3535A}"/>
               </a:ext>
               <a:ext uri="{C183D7F6-B498-43B3-948B-1728B52AA6E4}">
-                <adec:decorative xmlns:adec="http://schemas.microsoft.com/office/drawing/2017/decorative" val="1"/>
+                <adec:decorative xmlns:adec="http://schemas.microsoft.com/office/drawing/2017/decorative" xmlns="" val="1"/>
               </a:ext>
             </a:extLst>
           </p:cNvPr>
@@ -3948,12 +3946,287 @@
           <a:chExt cx="0" cy="0"/>
         </a:xfrm>
       </p:grpSpPr>
+      <p:sp>
+        <p:nvSpPr>
+          <p:cNvPr id="10" name="Rectangle 9">
+            <a:extLst>
+              <a:ext uri="{FF2B5EF4-FFF2-40B4-BE49-F238E27FC236}">
+                <a16:creationId xmlns:a16="http://schemas.microsoft.com/office/drawing/2014/main" id="{CDA1A2E9-63FE-408D-A803-8E306ECAB4B3}"/>
+              </a:ext>
+              <a:ext uri="{C183D7F6-B498-43B3-948B-1728B52AA6E4}">
+                <adec:decorative xmlns:adec="http://schemas.microsoft.com/office/drawing/2017/decorative" xmlns="" val="1"/>
+              </a:ext>
+            </a:extLst>
+          </p:cNvPr>
+          <p:cNvSpPr>
+            <a:spLocks noGrp="1" noRot="1" noChangeAspect="1" noMove="1" noResize="1" noEditPoints="1" noAdjustHandles="1" noChangeArrowheads="1" noChangeShapeType="1" noTextEdit="1"/>
+          </p:cNvSpPr>
+          <p:nvPr>
+            <p:extLst>
+              <p:ext uri="{386F3935-93C4-4BCD-93E2-E3B085C9AB24}">
+                <p16:designElem xmlns:p16="http://schemas.microsoft.com/office/powerpoint/2015/main" val="1"/>
+              </p:ext>
+            </p:extLst>
+          </p:nvPr>
+        </p:nvSpPr>
+        <p:spPr>
+          <a:xfrm>
+            <a:off x="462058" y="450221"/>
+            <a:ext cx="11272742" cy="3918123"/>
+          </a:xfrm>
+          <a:prstGeom prst="rect">
+            <a:avLst/>
+          </a:prstGeom>
+          <a:solidFill>
+            <a:srgbClr val="404040">
+              <a:alpha val="95000"/>
+            </a:srgbClr>
+          </a:solidFill>
+          <a:ln w="25400">
+            <a:noFill/>
+          </a:ln>
+        </p:spPr>
+        <p:style>
+          <a:lnRef idx="2">
+            <a:schemeClr val="accent1">
+              <a:shade val="50000"/>
+            </a:schemeClr>
+          </a:lnRef>
+          <a:fillRef idx="1">
+            <a:schemeClr val="accent1"/>
+          </a:fillRef>
+          <a:effectRef idx="0">
+            <a:schemeClr val="accent1"/>
+          </a:effectRef>
+          <a:fontRef idx="minor">
+            <a:schemeClr val="lt1"/>
+          </a:fontRef>
+        </p:style>
+        <p:txBody>
+          <a:bodyPr rtlCol="0" anchor="ctr"/>
+          <a:lstStyle/>
+          <a:p>
+            <a:pPr marL="0" marR="0" lvl="0" indent="0" algn="ctr" defTabSz="914400" rtl="0" eaLnBrk="1" fontAlgn="auto" latinLnBrk="0" hangingPunct="1">
+              <a:lnSpc>
+                <a:spcPct val="100000"/>
+              </a:lnSpc>
+              <a:spcBef>
+                <a:spcPts val="0"/>
+              </a:spcBef>
+              <a:spcAft>
+                <a:spcPts val="0"/>
+              </a:spcAft>
+              <a:buClrTx/>
+              <a:buSzTx/>
+              <a:buFontTx/>
+              <a:buNone/>
+              <a:tabLst/>
+              <a:defRPr/>
+            </a:pPr>
+            <a:endParaRPr kumimoji="0" lang="en-US" sz="1800" b="0" i="0" u="none" strike="noStrike" kern="1200" cap="none" spc="0" normalizeH="0" baseline="0" noProof="0">
+              <a:ln>
+                <a:noFill/>
+              </a:ln>
+              <a:solidFill>
+                <a:srgbClr val="404040"/>
+              </a:solidFill>
+              <a:effectLst/>
+              <a:uLnTx/>
+              <a:uFillTx/>
+              <a:latin typeface="Calibri" panose="020F0502020204030204"/>
+              <a:ea typeface="+mn-ea"/>
+              <a:cs typeface="+mn-cs"/>
+            </a:endParaRPr>
+          </a:p>
+        </p:txBody>
+      </p:sp>
+      <p:sp>
+        <p:nvSpPr>
+          <p:cNvPr id="2" name="Title 1">
+            <a:extLst>
+              <a:ext uri="{FF2B5EF4-FFF2-40B4-BE49-F238E27FC236}">
+                <a16:creationId xmlns:a16="http://schemas.microsoft.com/office/drawing/2014/main" id="{3A72E24B-250D-407C-98D9-47C79A7DB005}"/>
+              </a:ext>
+            </a:extLst>
+          </p:cNvPr>
+          <p:cNvSpPr>
+            <a:spLocks noGrp="1"/>
+          </p:cNvSpPr>
+          <p:nvPr>
+            <p:ph type="title"/>
+          </p:nvPr>
+        </p:nvSpPr>
+        <p:spPr>
+          <a:xfrm>
+            <a:off x="1100669" y="1111086"/>
+            <a:ext cx="10011831" cy="2623885"/>
+          </a:xfrm>
+        </p:spPr>
+        <p:txBody>
+          <a:bodyPr vert="horz" lIns="91440" tIns="45720" rIns="91440" bIns="45720" rtlCol="0" anchor="ctr">
+            <a:normAutofit/>
+          </a:bodyPr>
+          <a:lstStyle/>
+          <a:p>
+            <a:r>
+              <a:rPr lang="en-US" sz="6000" kern="1200">
+                <a:solidFill>
+                  <a:srgbClr val="FFFFFF"/>
+                </a:solidFill>
+                <a:latin typeface="+mj-lt"/>
+                <a:ea typeface="+mj-ea"/>
+                <a:cs typeface="+mj-cs"/>
+              </a:rPr>
+              <a:t>Exit Ticket</a:t>
+            </a:r>
+          </a:p>
+        </p:txBody>
+      </p:sp>
+      <p:sp>
+        <p:nvSpPr>
+          <p:cNvPr id="12" name="Rectangle 11">
+            <a:extLst>
+              <a:ext uri="{FF2B5EF4-FFF2-40B4-BE49-F238E27FC236}">
+                <a16:creationId xmlns:a16="http://schemas.microsoft.com/office/drawing/2014/main" id="{FBE9F90C-C163-435B-9A68-D15C92D1CF2B}"/>
+              </a:ext>
+              <a:ext uri="{C183D7F6-B498-43B3-948B-1728B52AA6E4}">
+                <adec:decorative xmlns:adec="http://schemas.microsoft.com/office/drawing/2017/decorative" xmlns="" val="1"/>
+              </a:ext>
+            </a:extLst>
+          </p:cNvPr>
+          <p:cNvSpPr>
+            <a:spLocks noGrp="1" noRot="1" noChangeAspect="1" noMove="1" noResize="1" noEditPoints="1" noAdjustHandles="1" noChangeArrowheads="1" noChangeShapeType="1" noTextEdit="1"/>
+          </p:cNvSpPr>
+          <p:nvPr>
+            <p:extLst>
+              <p:ext uri="{386F3935-93C4-4BCD-93E2-E3B085C9AB24}">
+                <p16:designElem xmlns:p16="http://schemas.microsoft.com/office/powerpoint/2015/main" val="1"/>
+              </p:ext>
+            </p:extLst>
+          </p:nvPr>
+        </p:nvSpPr>
+        <p:spPr>
+          <a:xfrm>
+            <a:off x="457200" y="4521269"/>
+            <a:ext cx="6699246" cy="1877811"/>
+          </a:xfrm>
+          <a:prstGeom prst="rect">
+            <a:avLst/>
+          </a:prstGeom>
+          <a:solidFill>
+            <a:srgbClr val="A5A5A5">
+              <a:alpha val="80000"/>
+            </a:srgbClr>
+          </a:solidFill>
+          <a:ln w="25400">
+            <a:noFill/>
+          </a:ln>
+        </p:spPr>
+        <p:style>
+          <a:lnRef idx="2">
+            <a:schemeClr val="accent1">
+              <a:shade val="50000"/>
+            </a:schemeClr>
+          </a:lnRef>
+          <a:fillRef idx="1">
+            <a:schemeClr val="accent1"/>
+          </a:fillRef>
+          <a:effectRef idx="0">
+            <a:schemeClr val="accent1"/>
+          </a:effectRef>
+          <a:fontRef idx="minor">
+            <a:schemeClr val="lt1"/>
+          </a:fontRef>
+        </p:style>
+        <p:txBody>
+          <a:bodyPr rtlCol="0" anchor="ctr"/>
+          <a:lstStyle/>
+          <a:p>
+            <a:pPr marL="0" marR="0" lvl="0" indent="0" algn="ctr" defTabSz="914400" rtl="0" eaLnBrk="1" fontAlgn="auto" latinLnBrk="0" hangingPunct="1">
+              <a:lnSpc>
+                <a:spcPct val="100000"/>
+              </a:lnSpc>
+              <a:spcBef>
+                <a:spcPts val="0"/>
+              </a:spcBef>
+              <a:spcAft>
+                <a:spcPts val="0"/>
+              </a:spcAft>
+              <a:buClrTx/>
+              <a:buSzTx/>
+              <a:buFontTx/>
+              <a:buNone/>
+              <a:tabLst/>
+              <a:defRPr/>
+            </a:pPr>
+            <a:endParaRPr kumimoji="0" lang="en-US" sz="1800" b="0" i="0" u="none" strike="noStrike" kern="1200" cap="none" spc="0" normalizeH="0" baseline="0" noProof="0">
+              <a:ln>
+                <a:noFill/>
+              </a:ln>
+              <a:solidFill>
+                <a:srgbClr val="FFFFFF"/>
+              </a:solidFill>
+              <a:effectLst/>
+              <a:uLnTx/>
+              <a:uFillTx/>
+              <a:latin typeface="Calibri" panose="020F0502020204030204"/>
+              <a:ea typeface="+mn-ea"/>
+              <a:cs typeface="+mn-cs"/>
+            </a:endParaRPr>
+          </a:p>
+        </p:txBody>
+      </p:sp>
+      <p:sp>
+        <p:nvSpPr>
+          <p:cNvPr id="3" name="Content Placeholder 2">
+            <a:extLst>
+              <a:ext uri="{FF2B5EF4-FFF2-40B4-BE49-F238E27FC236}">
+                <a16:creationId xmlns:a16="http://schemas.microsoft.com/office/drawing/2014/main" id="{47B850F7-2047-4E01-BD80-512565CB5F91}"/>
+              </a:ext>
+            </a:extLst>
+          </p:cNvPr>
+          <p:cNvSpPr>
+            <a:spLocks noGrp="1"/>
+          </p:cNvSpPr>
+          <p:nvPr>
+            <p:ph idx="1"/>
+          </p:nvPr>
+        </p:nvSpPr>
+        <p:spPr>
+          <a:xfrm>
+            <a:off x="1079500" y="4843002"/>
+            <a:ext cx="5433479" cy="1234345"/>
+          </a:xfrm>
+        </p:spPr>
+        <p:txBody>
+          <a:bodyPr vert="horz" lIns="91440" tIns="45720" rIns="91440" bIns="45720" rtlCol="0" anchor="ctr">
+            <a:normAutofit/>
+          </a:bodyPr>
+          <a:lstStyle/>
+          <a:p>
+            <a:pPr marL="0" indent="0">
+              <a:buNone/>
+            </a:pPr>
+            <a:r>
+              <a:rPr lang="en-US" sz="2400" kern="1200">
+                <a:solidFill>
+                  <a:srgbClr val="1B1B1B"/>
+                </a:solidFill>
+                <a:latin typeface="+mn-lt"/>
+                <a:ea typeface="+mn-ea"/>
+                <a:cs typeface="+mn-cs"/>
+              </a:rPr>
+              <a:t>Share one thing you learned today that you didn’t know before class!</a:t>
+            </a:r>
+          </a:p>
+        </p:txBody>
+      </p:sp>
       <p:pic>
         <p:nvPicPr>
-          <p:cNvPr id="16" name="Graphic 6">
+          <p:cNvPr id="7" name="Graphic 6" descr="Thought bubble">
             <a:extLst>
               <a:ext uri="{FF2B5EF4-FFF2-40B4-BE49-F238E27FC236}">
-                <a16:creationId xmlns:a16="http://schemas.microsoft.com/office/drawing/2014/main" id="{1AC97B56-0A17-4E09-BF93-240A658CD4B6}"/>
+                <a16:creationId xmlns:a16="http://schemas.microsoft.com/office/drawing/2014/main" id="{D4765563-368F-4728-A7C9-87996B31B12F}"/>
               </a:ext>
             </a:extLst>
           </p:cNvPr>
@@ -3963,13 +4236,13 @@
           <p:nvPr/>
         </p:nvPicPr>
         <p:blipFill>
-          <a:blip r:embed="rId3">
+          <a:blip r:embed="rId2">
             <a:extLst>
               <a:ext uri="{28A0092B-C50C-407E-A947-70E740481C1C}">
                 <a14:useLocalDpi xmlns:a14="http://schemas.microsoft.com/office/drawing/2010/main" val="0"/>
               </a:ext>
               <a:ext uri="{96DAC541-7B7A-43D3-8B79-37D633B846F1}">
-                <asvg:svgBlip xmlns:asvg="http://schemas.microsoft.com/office/drawing/2016/SVG/main" r:embed="rId4"/>
+                <asvg:svgBlip xmlns:asvg="http://schemas.microsoft.com/office/drawing/2016/SVG/main" xmlns="" r:embed="rId3"/>
               </a:ext>
             </a:extLst>
           </a:blip>
@@ -3989,13 +4262,13 @@
       </p:pic>
       <p:sp>
         <p:nvSpPr>
-          <p:cNvPr id="17" name="Rectangle 9">
+          <p:cNvPr id="14" name="Rectangle 13">
             <a:extLst>
               <a:ext uri="{FF2B5EF4-FFF2-40B4-BE49-F238E27FC236}">
                 <a16:creationId xmlns:a16="http://schemas.microsoft.com/office/drawing/2014/main" id="{1A882A9F-F4E9-4E23-8F0B-20B5DF42EAA9}"/>
               </a:ext>
               <a:ext uri="{C183D7F6-B498-43B3-948B-1728B52AA6E4}">
-                <adec:decorative xmlns:adec="http://schemas.microsoft.com/office/drawing/2017/decorative" val="1"/>
+                <adec:decorative xmlns:adec="http://schemas.microsoft.com/office/drawing/2017/decorative" xmlns="" val="1"/>
               </a:ext>
             </a:extLst>
           </p:cNvPr>
@@ -4081,773 +4354,6 @@
           </a:p>
         </p:txBody>
       </p:sp>
-      <p:sp>
-        <p:nvSpPr>
-          <p:cNvPr id="18" name="Rectangle 11">
-            <a:extLst>
-              <a:ext uri="{FF2B5EF4-FFF2-40B4-BE49-F238E27FC236}">
-                <a16:creationId xmlns:a16="http://schemas.microsoft.com/office/drawing/2014/main" id="{FBE9F90C-C163-435B-9A68-D15C92D1CF2B}"/>
-              </a:ext>
-              <a:ext uri="{C183D7F6-B498-43B3-948B-1728B52AA6E4}">
-                <adec:decorative xmlns:adec="http://schemas.microsoft.com/office/drawing/2017/decorative" val="1"/>
-              </a:ext>
-            </a:extLst>
-          </p:cNvPr>
-          <p:cNvSpPr>
-            <a:spLocks noGrp="1" noRot="1" noChangeAspect="1" noMove="1" noResize="1" noEditPoints="1" noAdjustHandles="1" noChangeArrowheads="1" noChangeShapeType="1" noTextEdit="1"/>
-          </p:cNvSpPr>
-          <p:nvPr>
-            <p:extLst>
-              <p:ext uri="{386F3935-93C4-4BCD-93E2-E3B085C9AB24}">
-                <p16:designElem xmlns:p16="http://schemas.microsoft.com/office/powerpoint/2015/main" val="1"/>
-              </p:ext>
-            </p:extLst>
-          </p:nvPr>
-        </p:nvSpPr>
-        <p:spPr>
-          <a:xfrm>
-            <a:off x="457200" y="4521269"/>
-            <a:ext cx="6699246" cy="1877811"/>
-          </a:xfrm>
-          <a:prstGeom prst="rect">
-            <a:avLst/>
-          </a:prstGeom>
-          <a:solidFill>
-            <a:srgbClr val="A5A5A5">
-              <a:alpha val="80000"/>
-            </a:srgbClr>
-          </a:solidFill>
-          <a:ln w="25400">
-            <a:noFill/>
-          </a:ln>
-        </p:spPr>
-        <p:style>
-          <a:lnRef idx="2">
-            <a:schemeClr val="accent1">
-              <a:shade val="50000"/>
-            </a:schemeClr>
-          </a:lnRef>
-          <a:fillRef idx="1">
-            <a:schemeClr val="accent1"/>
-          </a:fillRef>
-          <a:effectRef idx="0">
-            <a:schemeClr val="accent1"/>
-          </a:effectRef>
-          <a:fontRef idx="minor">
-            <a:schemeClr val="lt1"/>
-          </a:fontRef>
-        </p:style>
-        <p:txBody>
-          <a:bodyPr rtlCol="0" anchor="ctr"/>
-          <a:lstStyle/>
-          <a:p>
-            <a:pPr marL="0" marR="0" lvl="0" indent="0" algn="ctr" defTabSz="914400" rtl="0" eaLnBrk="1" fontAlgn="auto" latinLnBrk="0" hangingPunct="1">
-              <a:lnSpc>
-                <a:spcPct val="100000"/>
-              </a:lnSpc>
-              <a:spcBef>
-                <a:spcPts val="0"/>
-              </a:spcBef>
-              <a:spcAft>
-                <a:spcPts val="0"/>
-              </a:spcAft>
-              <a:buClrTx/>
-              <a:buSzTx/>
-              <a:buFontTx/>
-              <a:buNone/>
-              <a:tabLst/>
-              <a:defRPr/>
-            </a:pPr>
-            <a:endParaRPr kumimoji="0" lang="en-US" sz="1800" b="0" i="0" u="none" strike="noStrike" kern="1200" cap="none" spc="0" normalizeH="0" baseline="0" noProof="0">
-              <a:ln>
-                <a:noFill/>
-              </a:ln>
-              <a:solidFill>
-                <a:srgbClr val="FFFFFF"/>
-              </a:solidFill>
-              <a:effectLst/>
-              <a:uLnTx/>
-              <a:uFillTx/>
-              <a:latin typeface="Calibri" panose="020F0502020204030204"/>
-              <a:ea typeface="+mn-ea"/>
-              <a:cs typeface="+mn-cs"/>
-            </a:endParaRPr>
-          </a:p>
-        </p:txBody>
-      </p:sp>
-      <p:sp>
-        <p:nvSpPr>
-          <p:cNvPr id="19" name="Rectangle 13">
-            <a:extLst>
-              <a:ext uri="{FF2B5EF4-FFF2-40B4-BE49-F238E27FC236}">
-                <a16:creationId xmlns:a16="http://schemas.microsoft.com/office/drawing/2014/main" id="{CDA1A2E9-63FE-408D-A803-8E306ECAB4B3}"/>
-              </a:ext>
-              <a:ext uri="{C183D7F6-B498-43B3-948B-1728B52AA6E4}">
-                <adec:decorative xmlns:adec="http://schemas.microsoft.com/office/drawing/2017/decorative" val="1"/>
-              </a:ext>
-            </a:extLst>
-          </p:cNvPr>
-          <p:cNvSpPr>
-            <a:spLocks noGrp="1" noRot="1" noChangeAspect="1" noMove="1" noResize="1" noEditPoints="1" noAdjustHandles="1" noChangeArrowheads="1" noChangeShapeType="1" noTextEdit="1"/>
-          </p:cNvSpPr>
-          <p:nvPr>
-            <p:extLst>
-              <p:ext uri="{386F3935-93C4-4BCD-93E2-E3B085C9AB24}">
-                <p16:designElem xmlns:p16="http://schemas.microsoft.com/office/powerpoint/2015/main" val="1"/>
-              </p:ext>
-            </p:extLst>
-          </p:nvPr>
-        </p:nvSpPr>
-        <p:spPr>
-          <a:xfrm>
-            <a:off x="462058" y="450221"/>
-            <a:ext cx="11272742" cy="3918123"/>
-          </a:xfrm>
-          <a:prstGeom prst="rect">
-            <a:avLst/>
-          </a:prstGeom>
-          <a:solidFill>
-            <a:srgbClr val="404040">
-              <a:alpha val="95000"/>
-            </a:srgbClr>
-          </a:solidFill>
-          <a:ln w="25400">
-            <a:noFill/>
-          </a:ln>
-        </p:spPr>
-        <p:style>
-          <a:lnRef idx="2">
-            <a:schemeClr val="accent1">
-              <a:shade val="50000"/>
-            </a:schemeClr>
-          </a:lnRef>
-          <a:fillRef idx="1">
-            <a:schemeClr val="accent1"/>
-          </a:fillRef>
-          <a:effectRef idx="0">
-            <a:schemeClr val="accent1"/>
-          </a:effectRef>
-          <a:fontRef idx="minor">
-            <a:schemeClr val="lt1"/>
-          </a:fontRef>
-        </p:style>
-        <p:txBody>
-          <a:bodyPr rtlCol="0" anchor="ctr"/>
-          <a:lstStyle/>
-          <a:p>
-            <a:pPr marL="0" marR="0" lvl="0" indent="0" algn="ctr" defTabSz="914400" rtl="0" eaLnBrk="1" fontAlgn="auto" latinLnBrk="0" hangingPunct="1">
-              <a:lnSpc>
-                <a:spcPct val="100000"/>
-              </a:lnSpc>
-              <a:spcBef>
-                <a:spcPts val="0"/>
-              </a:spcBef>
-              <a:spcAft>
-                <a:spcPts val="0"/>
-              </a:spcAft>
-              <a:buClrTx/>
-              <a:buSzTx/>
-              <a:buFontTx/>
-              <a:buNone/>
-              <a:tabLst/>
-              <a:defRPr/>
-            </a:pPr>
-            <a:endParaRPr kumimoji="0" lang="en-US" sz="1800" b="0" i="0" u="none" strike="noStrike" kern="1200" cap="none" spc="0" normalizeH="0" baseline="0" noProof="0">
-              <a:ln>
-                <a:noFill/>
-              </a:ln>
-              <a:solidFill>
-                <a:srgbClr val="404040"/>
-              </a:solidFill>
-              <a:effectLst/>
-              <a:uLnTx/>
-              <a:uFillTx/>
-              <a:latin typeface="Calibri" panose="020F0502020204030204"/>
-              <a:ea typeface="+mn-ea"/>
-              <a:cs typeface="+mn-cs"/>
-            </a:endParaRPr>
-          </a:p>
-        </p:txBody>
-      </p:sp>
-      <p:sp>
-        <p:nvSpPr>
-          <p:cNvPr id="2" name="Title 1">
-            <a:extLst>
-              <a:ext uri="{FF2B5EF4-FFF2-40B4-BE49-F238E27FC236}">
-                <a16:creationId xmlns:a16="http://schemas.microsoft.com/office/drawing/2014/main" id="{DF8C2470-B33F-489C-85D3-DB9DBD5FD510}"/>
-              </a:ext>
-            </a:extLst>
-          </p:cNvPr>
-          <p:cNvSpPr>
-            <a:spLocks noGrp="1"/>
-          </p:cNvSpPr>
-          <p:nvPr>
-            <p:ph type="title"/>
-          </p:nvPr>
-        </p:nvSpPr>
-        <p:spPr>
-          <a:xfrm>
-            <a:off x="1100669" y="1111086"/>
-            <a:ext cx="10011831" cy="2623885"/>
-          </a:xfrm>
-        </p:spPr>
-        <p:txBody>
-          <a:bodyPr vert="horz" lIns="91440" tIns="45720" rIns="91440" bIns="45720" rtlCol="0" anchor="ctr">
-            <a:normAutofit/>
-          </a:bodyPr>
-          <a:lstStyle/>
-          <a:p>
-            <a:r>
-              <a:rPr lang="en-US" sz="6000" kern="1200" dirty="0">
-                <a:solidFill>
-                  <a:srgbClr val="FFFFFF"/>
-                </a:solidFill>
-                <a:latin typeface="+mj-lt"/>
-                <a:ea typeface="+mj-ea"/>
-                <a:cs typeface="+mj-cs"/>
-              </a:rPr>
-              <a:t>Your To-Do List</a:t>
-            </a:r>
-          </a:p>
-        </p:txBody>
-      </p:sp>
-      <p:sp>
-        <p:nvSpPr>
-          <p:cNvPr id="3" name="Content Placeholder 2">
-            <a:extLst>
-              <a:ext uri="{FF2B5EF4-FFF2-40B4-BE49-F238E27FC236}">
-                <a16:creationId xmlns:a16="http://schemas.microsoft.com/office/drawing/2014/main" id="{A0438F36-24BA-4093-B476-DCD76C10362F}"/>
-              </a:ext>
-            </a:extLst>
-          </p:cNvPr>
-          <p:cNvSpPr>
-            <a:spLocks noGrp="1"/>
-          </p:cNvSpPr>
-          <p:nvPr>
-            <p:ph idx="1"/>
-          </p:nvPr>
-        </p:nvSpPr>
-        <p:spPr>
-          <a:xfrm>
-            <a:off x="1079500" y="4843002"/>
-            <a:ext cx="5433479" cy="1234345"/>
-          </a:xfrm>
-        </p:spPr>
-        <p:txBody>
-          <a:bodyPr vert="horz" lIns="91440" tIns="45720" rIns="91440" bIns="45720" rtlCol="0" anchor="ctr">
-            <a:normAutofit/>
-          </a:bodyPr>
-          <a:lstStyle/>
-          <a:p>
-            <a:pPr marL="0" indent="0">
-              <a:buNone/>
-            </a:pPr>
-            <a:r>
-              <a:rPr lang="en-US" sz="2400" kern="1200">
-                <a:solidFill>
-                  <a:srgbClr val="1B1B1B"/>
-                </a:solidFill>
-                <a:latin typeface="+mn-lt"/>
-                <a:ea typeface="+mn-ea"/>
-                <a:cs typeface="+mn-cs"/>
-              </a:rPr>
-              <a:t>What to work on for next class</a:t>
-            </a:r>
-          </a:p>
-        </p:txBody>
-      </p:sp>
-      <p:sp>
-        <p:nvSpPr>
-          <p:cNvPr id="4" name="Rectangle 3">
-            <a:extLst>
-              <a:ext uri="{FF2B5EF4-FFF2-40B4-BE49-F238E27FC236}">
-                <a16:creationId xmlns:a16="http://schemas.microsoft.com/office/drawing/2014/main" id="{1207E67E-7394-4606-A6DF-DA68FC43D951}"/>
-              </a:ext>
-            </a:extLst>
-          </p:cNvPr>
-          <p:cNvSpPr/>
-          <p:nvPr/>
-        </p:nvSpPr>
-        <p:spPr>
-          <a:xfrm>
-            <a:off x="9619345" y="4521269"/>
-            <a:ext cx="2115455" cy="1886510"/>
-          </a:xfrm>
-          <a:prstGeom prst="rect">
-            <a:avLst/>
-          </a:prstGeom>
-        </p:spPr>
-        <p:style>
-          <a:lnRef idx="2">
-            <a:schemeClr val="accent6">
-              <a:shade val="50000"/>
-            </a:schemeClr>
-          </a:lnRef>
-          <a:fillRef idx="1">
-            <a:schemeClr val="accent6"/>
-          </a:fillRef>
-          <a:effectRef idx="0">
-            <a:schemeClr val="accent6"/>
-          </a:effectRef>
-          <a:fontRef idx="minor">
-            <a:schemeClr val="lt1"/>
-          </a:fontRef>
-        </p:style>
-        <p:txBody>
-          <a:bodyPr rtlCol="0" anchor="ctr"/>
-          <a:lstStyle/>
-          <a:p>
-            <a:pPr algn="ctr"/>
-            <a:endParaRPr lang="en-US"/>
-          </a:p>
-        </p:txBody>
-      </p:sp>
-    </p:spTree>
-    <p:extLst>
-      <p:ext uri="{BB962C8B-B14F-4D97-AF65-F5344CB8AC3E}">
-        <p14:creationId xmlns:p14="http://schemas.microsoft.com/office/powerpoint/2010/main" val="4223807422"/>
-      </p:ext>
-    </p:extLst>
-  </p:cSld>
-  <p:clrMapOvr>
-    <a:masterClrMapping/>
-  </p:clrMapOvr>
-</p:sld>
-</file>
-
-<file path=ppt/slides/slide11.xml><?xml version="1.0" encoding="utf-8"?>
-<p:sld xmlns:a="http://schemas.openxmlformats.org/drawingml/2006/main" xmlns:r="http://schemas.openxmlformats.org/officeDocument/2006/relationships" xmlns:p="http://schemas.openxmlformats.org/presentationml/2006/main">
-  <p:cSld>
-    <p:bg>
-      <p:bgPr>
-        <a:solidFill>
-          <a:schemeClr val="bg1"/>
-        </a:solidFill>
-        <a:effectLst/>
-      </p:bgPr>
-    </p:bg>
-    <p:spTree>
-      <p:nvGrpSpPr>
-        <p:cNvPr id="1" name=""/>
-        <p:cNvGrpSpPr/>
-        <p:nvPr/>
-      </p:nvGrpSpPr>
-      <p:grpSpPr>
-        <a:xfrm>
-          <a:off x="0" y="0"/>
-          <a:ext cx="0" cy="0"/>
-          <a:chOff x="0" y="0"/>
-          <a:chExt cx="0" cy="0"/>
-        </a:xfrm>
-      </p:grpSpPr>
-      <p:sp>
-        <p:nvSpPr>
-          <p:cNvPr id="10" name="Rectangle 9">
-            <a:extLst>
-              <a:ext uri="{FF2B5EF4-FFF2-40B4-BE49-F238E27FC236}">
-                <a16:creationId xmlns:a16="http://schemas.microsoft.com/office/drawing/2014/main" id="{CDA1A2E9-63FE-408D-A803-8E306ECAB4B3}"/>
-              </a:ext>
-              <a:ext uri="{C183D7F6-B498-43B3-948B-1728B52AA6E4}">
-                <adec:decorative xmlns:adec="http://schemas.microsoft.com/office/drawing/2017/decorative" val="1"/>
-              </a:ext>
-            </a:extLst>
-          </p:cNvPr>
-          <p:cNvSpPr>
-            <a:spLocks noGrp="1" noRot="1" noChangeAspect="1" noMove="1" noResize="1" noEditPoints="1" noAdjustHandles="1" noChangeArrowheads="1" noChangeShapeType="1" noTextEdit="1"/>
-          </p:cNvSpPr>
-          <p:nvPr>
-            <p:extLst>
-              <p:ext uri="{386F3935-93C4-4BCD-93E2-E3B085C9AB24}">
-                <p16:designElem xmlns:p16="http://schemas.microsoft.com/office/powerpoint/2015/main" val="1"/>
-              </p:ext>
-            </p:extLst>
-          </p:nvPr>
-        </p:nvSpPr>
-        <p:spPr>
-          <a:xfrm>
-            <a:off x="462058" y="450221"/>
-            <a:ext cx="11272742" cy="3918123"/>
-          </a:xfrm>
-          <a:prstGeom prst="rect">
-            <a:avLst/>
-          </a:prstGeom>
-          <a:solidFill>
-            <a:srgbClr val="404040">
-              <a:alpha val="95000"/>
-            </a:srgbClr>
-          </a:solidFill>
-          <a:ln w="25400">
-            <a:noFill/>
-          </a:ln>
-        </p:spPr>
-        <p:style>
-          <a:lnRef idx="2">
-            <a:schemeClr val="accent1">
-              <a:shade val="50000"/>
-            </a:schemeClr>
-          </a:lnRef>
-          <a:fillRef idx="1">
-            <a:schemeClr val="accent1"/>
-          </a:fillRef>
-          <a:effectRef idx="0">
-            <a:schemeClr val="accent1"/>
-          </a:effectRef>
-          <a:fontRef idx="minor">
-            <a:schemeClr val="lt1"/>
-          </a:fontRef>
-        </p:style>
-        <p:txBody>
-          <a:bodyPr rtlCol="0" anchor="ctr"/>
-          <a:lstStyle/>
-          <a:p>
-            <a:pPr marL="0" marR="0" lvl="0" indent="0" algn="ctr" defTabSz="914400" rtl="0" eaLnBrk="1" fontAlgn="auto" latinLnBrk="0" hangingPunct="1">
-              <a:lnSpc>
-                <a:spcPct val="100000"/>
-              </a:lnSpc>
-              <a:spcBef>
-                <a:spcPts val="0"/>
-              </a:spcBef>
-              <a:spcAft>
-                <a:spcPts val="0"/>
-              </a:spcAft>
-              <a:buClrTx/>
-              <a:buSzTx/>
-              <a:buFontTx/>
-              <a:buNone/>
-              <a:tabLst/>
-              <a:defRPr/>
-            </a:pPr>
-            <a:endParaRPr kumimoji="0" lang="en-US" sz="1800" b="0" i="0" u="none" strike="noStrike" kern="1200" cap="none" spc="0" normalizeH="0" baseline="0" noProof="0">
-              <a:ln>
-                <a:noFill/>
-              </a:ln>
-              <a:solidFill>
-                <a:srgbClr val="404040"/>
-              </a:solidFill>
-              <a:effectLst/>
-              <a:uLnTx/>
-              <a:uFillTx/>
-              <a:latin typeface="Calibri" panose="020F0502020204030204"/>
-              <a:ea typeface="+mn-ea"/>
-              <a:cs typeface="+mn-cs"/>
-            </a:endParaRPr>
-          </a:p>
-        </p:txBody>
-      </p:sp>
-      <p:sp>
-        <p:nvSpPr>
-          <p:cNvPr id="2" name="Title 1">
-            <a:extLst>
-              <a:ext uri="{FF2B5EF4-FFF2-40B4-BE49-F238E27FC236}">
-                <a16:creationId xmlns:a16="http://schemas.microsoft.com/office/drawing/2014/main" id="{3A72E24B-250D-407C-98D9-47C79A7DB005}"/>
-              </a:ext>
-            </a:extLst>
-          </p:cNvPr>
-          <p:cNvSpPr>
-            <a:spLocks noGrp="1"/>
-          </p:cNvSpPr>
-          <p:nvPr>
-            <p:ph type="title"/>
-          </p:nvPr>
-        </p:nvSpPr>
-        <p:spPr>
-          <a:xfrm>
-            <a:off x="1100669" y="1111086"/>
-            <a:ext cx="10011831" cy="2623885"/>
-          </a:xfrm>
-        </p:spPr>
-        <p:txBody>
-          <a:bodyPr vert="horz" lIns="91440" tIns="45720" rIns="91440" bIns="45720" rtlCol="0" anchor="ctr">
-            <a:normAutofit/>
-          </a:bodyPr>
-          <a:lstStyle/>
-          <a:p>
-            <a:r>
-              <a:rPr lang="en-US" sz="6000" kern="1200">
-                <a:solidFill>
-                  <a:srgbClr val="FFFFFF"/>
-                </a:solidFill>
-                <a:latin typeface="+mj-lt"/>
-                <a:ea typeface="+mj-ea"/>
-                <a:cs typeface="+mj-cs"/>
-              </a:rPr>
-              <a:t>Exit Ticket</a:t>
-            </a:r>
-          </a:p>
-        </p:txBody>
-      </p:sp>
-      <p:sp>
-        <p:nvSpPr>
-          <p:cNvPr id="12" name="Rectangle 11">
-            <a:extLst>
-              <a:ext uri="{FF2B5EF4-FFF2-40B4-BE49-F238E27FC236}">
-                <a16:creationId xmlns:a16="http://schemas.microsoft.com/office/drawing/2014/main" id="{FBE9F90C-C163-435B-9A68-D15C92D1CF2B}"/>
-              </a:ext>
-              <a:ext uri="{C183D7F6-B498-43B3-948B-1728B52AA6E4}">
-                <adec:decorative xmlns:adec="http://schemas.microsoft.com/office/drawing/2017/decorative" val="1"/>
-              </a:ext>
-            </a:extLst>
-          </p:cNvPr>
-          <p:cNvSpPr>
-            <a:spLocks noGrp="1" noRot="1" noChangeAspect="1" noMove="1" noResize="1" noEditPoints="1" noAdjustHandles="1" noChangeArrowheads="1" noChangeShapeType="1" noTextEdit="1"/>
-          </p:cNvSpPr>
-          <p:nvPr>
-            <p:extLst>
-              <p:ext uri="{386F3935-93C4-4BCD-93E2-E3B085C9AB24}">
-                <p16:designElem xmlns:p16="http://schemas.microsoft.com/office/powerpoint/2015/main" val="1"/>
-              </p:ext>
-            </p:extLst>
-          </p:nvPr>
-        </p:nvSpPr>
-        <p:spPr>
-          <a:xfrm>
-            <a:off x="457200" y="4521269"/>
-            <a:ext cx="6699246" cy="1877811"/>
-          </a:xfrm>
-          <a:prstGeom prst="rect">
-            <a:avLst/>
-          </a:prstGeom>
-          <a:solidFill>
-            <a:srgbClr val="A5A5A5">
-              <a:alpha val="80000"/>
-            </a:srgbClr>
-          </a:solidFill>
-          <a:ln w="25400">
-            <a:noFill/>
-          </a:ln>
-        </p:spPr>
-        <p:style>
-          <a:lnRef idx="2">
-            <a:schemeClr val="accent1">
-              <a:shade val="50000"/>
-            </a:schemeClr>
-          </a:lnRef>
-          <a:fillRef idx="1">
-            <a:schemeClr val="accent1"/>
-          </a:fillRef>
-          <a:effectRef idx="0">
-            <a:schemeClr val="accent1"/>
-          </a:effectRef>
-          <a:fontRef idx="minor">
-            <a:schemeClr val="lt1"/>
-          </a:fontRef>
-        </p:style>
-        <p:txBody>
-          <a:bodyPr rtlCol="0" anchor="ctr"/>
-          <a:lstStyle/>
-          <a:p>
-            <a:pPr marL="0" marR="0" lvl="0" indent="0" algn="ctr" defTabSz="914400" rtl="0" eaLnBrk="1" fontAlgn="auto" latinLnBrk="0" hangingPunct="1">
-              <a:lnSpc>
-                <a:spcPct val="100000"/>
-              </a:lnSpc>
-              <a:spcBef>
-                <a:spcPts val="0"/>
-              </a:spcBef>
-              <a:spcAft>
-                <a:spcPts val="0"/>
-              </a:spcAft>
-              <a:buClrTx/>
-              <a:buSzTx/>
-              <a:buFontTx/>
-              <a:buNone/>
-              <a:tabLst/>
-              <a:defRPr/>
-            </a:pPr>
-            <a:endParaRPr kumimoji="0" lang="en-US" sz="1800" b="0" i="0" u="none" strike="noStrike" kern="1200" cap="none" spc="0" normalizeH="0" baseline="0" noProof="0">
-              <a:ln>
-                <a:noFill/>
-              </a:ln>
-              <a:solidFill>
-                <a:srgbClr val="FFFFFF"/>
-              </a:solidFill>
-              <a:effectLst/>
-              <a:uLnTx/>
-              <a:uFillTx/>
-              <a:latin typeface="Calibri" panose="020F0502020204030204"/>
-              <a:ea typeface="+mn-ea"/>
-              <a:cs typeface="+mn-cs"/>
-            </a:endParaRPr>
-          </a:p>
-        </p:txBody>
-      </p:sp>
-      <p:sp>
-        <p:nvSpPr>
-          <p:cNvPr id="3" name="Content Placeholder 2">
-            <a:extLst>
-              <a:ext uri="{FF2B5EF4-FFF2-40B4-BE49-F238E27FC236}">
-                <a16:creationId xmlns:a16="http://schemas.microsoft.com/office/drawing/2014/main" id="{47B850F7-2047-4E01-BD80-512565CB5F91}"/>
-              </a:ext>
-            </a:extLst>
-          </p:cNvPr>
-          <p:cNvSpPr>
-            <a:spLocks noGrp="1"/>
-          </p:cNvSpPr>
-          <p:nvPr>
-            <p:ph idx="1"/>
-          </p:nvPr>
-        </p:nvSpPr>
-        <p:spPr>
-          <a:xfrm>
-            <a:off x="1079500" y="4843002"/>
-            <a:ext cx="5433479" cy="1234345"/>
-          </a:xfrm>
-        </p:spPr>
-        <p:txBody>
-          <a:bodyPr vert="horz" lIns="91440" tIns="45720" rIns="91440" bIns="45720" rtlCol="0" anchor="ctr">
-            <a:normAutofit/>
-          </a:bodyPr>
-          <a:lstStyle/>
-          <a:p>
-            <a:pPr marL="0" indent="0">
-              <a:buNone/>
-            </a:pPr>
-            <a:r>
-              <a:rPr lang="en-US" sz="2400" kern="1200">
-                <a:solidFill>
-                  <a:srgbClr val="1B1B1B"/>
-                </a:solidFill>
-                <a:latin typeface="+mn-lt"/>
-                <a:ea typeface="+mn-ea"/>
-                <a:cs typeface="+mn-cs"/>
-              </a:rPr>
-              <a:t>Share one thing you learned today that you didn’t know before class!</a:t>
-            </a:r>
-          </a:p>
-        </p:txBody>
-      </p:sp>
-      <p:pic>
-        <p:nvPicPr>
-          <p:cNvPr id="7" name="Graphic 6" descr="Thought bubble">
-            <a:extLst>
-              <a:ext uri="{FF2B5EF4-FFF2-40B4-BE49-F238E27FC236}">
-                <a16:creationId xmlns:a16="http://schemas.microsoft.com/office/drawing/2014/main" id="{D4765563-368F-4728-A7C9-87996B31B12F}"/>
-              </a:ext>
-            </a:extLst>
-          </p:cNvPr>
-          <p:cNvPicPr>
-            <a:picLocks noChangeAspect="1"/>
-          </p:cNvPicPr>
-          <p:nvPr/>
-        </p:nvPicPr>
-        <p:blipFill>
-          <a:blip r:embed="rId2">
-            <a:extLst>
-              <a:ext uri="{28A0092B-C50C-407E-A947-70E740481C1C}">
-                <a14:useLocalDpi xmlns:a14="http://schemas.microsoft.com/office/drawing/2010/main" val="0"/>
-              </a:ext>
-              <a:ext uri="{96DAC541-7B7A-43D3-8B79-37D633B846F1}">
-                <asvg:svgBlip xmlns:asvg="http://schemas.microsoft.com/office/drawing/2016/SVG/main" r:embed="rId3"/>
-              </a:ext>
-            </a:extLst>
-          </a:blip>
-          <a:stretch>
-            <a:fillRect/>
-          </a:stretch>
-        </p:blipFill>
-        <p:spPr>
-          <a:xfrm>
-            <a:off x="7571572" y="4648201"/>
-            <a:ext cx="1632648" cy="1632648"/>
-          </a:xfrm>
-          <a:prstGeom prst="rect">
-            <a:avLst/>
-          </a:prstGeom>
-        </p:spPr>
-      </p:pic>
-      <p:sp>
-        <p:nvSpPr>
-          <p:cNvPr id="14" name="Rectangle 13">
-            <a:extLst>
-              <a:ext uri="{FF2B5EF4-FFF2-40B4-BE49-F238E27FC236}">
-                <a16:creationId xmlns:a16="http://schemas.microsoft.com/office/drawing/2014/main" id="{1A882A9F-F4E9-4E23-8F0B-20B5DF42EAA9}"/>
-              </a:ext>
-              <a:ext uri="{C183D7F6-B498-43B3-948B-1728B52AA6E4}">
-                <adec:decorative xmlns:adec="http://schemas.microsoft.com/office/drawing/2017/decorative" val="1"/>
-              </a:ext>
-            </a:extLst>
-          </p:cNvPr>
-          <p:cNvSpPr>
-            <a:spLocks noGrp="1" noRot="1" noChangeAspect="1" noMove="1" noResize="1" noEditPoints="1" noAdjustHandles="1" noChangeArrowheads="1" noChangeShapeType="1" noTextEdit="1"/>
-          </p:cNvSpPr>
-          <p:nvPr>
-            <p:extLst>
-              <p:ext uri="{386F3935-93C4-4BCD-93E2-E3B085C9AB24}">
-                <p16:designElem xmlns:p16="http://schemas.microsoft.com/office/powerpoint/2015/main" val="1"/>
-              </p:ext>
-            </p:extLst>
-          </p:nvPr>
-        </p:nvSpPr>
-        <p:spPr>
-          <a:xfrm>
-            <a:off x="9619345" y="4521270"/>
-            <a:ext cx="2115455" cy="1890204"/>
-          </a:xfrm>
-          <a:prstGeom prst="rect">
-            <a:avLst/>
-          </a:prstGeom>
-          <a:solidFill>
-            <a:schemeClr val="accent1">
-              <a:alpha val="95000"/>
-            </a:schemeClr>
-          </a:solidFill>
-          <a:ln w="25400">
-            <a:noFill/>
-          </a:ln>
-        </p:spPr>
-        <p:style>
-          <a:lnRef idx="2">
-            <a:schemeClr val="accent1">
-              <a:shade val="50000"/>
-            </a:schemeClr>
-          </a:lnRef>
-          <a:fillRef idx="1">
-            <a:schemeClr val="accent1"/>
-          </a:fillRef>
-          <a:effectRef idx="0">
-            <a:schemeClr val="accent1"/>
-          </a:effectRef>
-          <a:fontRef idx="minor">
-            <a:schemeClr val="lt1"/>
-          </a:fontRef>
-        </p:style>
-        <p:txBody>
-          <a:bodyPr rtlCol="0" anchor="ctr"/>
-          <a:lstStyle/>
-          <a:p>
-            <a:pPr marL="0" marR="0" lvl="0" indent="0" algn="ctr" defTabSz="914400" rtl="0" eaLnBrk="1" fontAlgn="auto" latinLnBrk="0" hangingPunct="1">
-              <a:lnSpc>
-                <a:spcPct val="100000"/>
-              </a:lnSpc>
-              <a:spcBef>
-                <a:spcPts val="0"/>
-              </a:spcBef>
-              <a:spcAft>
-                <a:spcPts val="0"/>
-              </a:spcAft>
-              <a:buClrTx/>
-              <a:buSzTx/>
-              <a:buFontTx/>
-              <a:buNone/>
-              <a:tabLst/>
-              <a:defRPr/>
-            </a:pPr>
-            <a:endParaRPr kumimoji="0" lang="en-US" sz="1800" b="0" i="0" u="none" strike="noStrike" kern="1200" cap="none" spc="0" normalizeH="0" baseline="0" noProof="0">
-              <a:ln>
-                <a:noFill/>
-              </a:ln>
-              <a:solidFill>
-                <a:srgbClr val="FFFFFF"/>
-              </a:solidFill>
-              <a:effectLst/>
-              <a:uLnTx/>
-              <a:uFillTx/>
-              <a:latin typeface="Calibri" panose="020F0502020204030204"/>
-              <a:ea typeface="+mn-ea"/>
-              <a:cs typeface="+mn-cs"/>
-            </a:endParaRPr>
-          </a:p>
-        </p:txBody>
-      </p:sp>
     </p:spTree>
     <p:extLst>
       <p:ext uri="{BB962C8B-B14F-4D97-AF65-F5344CB8AC3E}">
@@ -4861,7 +4367,7 @@
 </p:sld>
 </file>
 
-<file path=ppt/slides/slide12.xml><?xml version="1.0" encoding="utf-8"?>
+<file path=ppt/slides/slide11.xml><?xml version="1.0" encoding="utf-8"?>
 <p:sld xmlns:a="http://schemas.openxmlformats.org/drawingml/2006/main" xmlns:r="http://schemas.openxmlformats.org/officeDocument/2006/relationships" xmlns:p="http://schemas.openxmlformats.org/presentationml/2006/main">
   <p:cSld>
     <p:bg>
@@ -4907,7 +4413,7 @@
                 <a14:useLocalDpi xmlns:a14="http://schemas.microsoft.com/office/drawing/2010/main" val="0"/>
               </a:ext>
               <a:ext uri="{96DAC541-7B7A-43D3-8B79-37D633B846F1}">
-                <asvg:svgBlip xmlns:asvg="http://schemas.microsoft.com/office/drawing/2016/SVG/main" r:embed="rId3"/>
+                <asvg:svgBlip xmlns:asvg="http://schemas.microsoft.com/office/drawing/2016/SVG/main" xmlns="" r:embed="rId3"/>
               </a:ext>
             </a:extLst>
           </a:blip>
@@ -4933,7 +4439,7 @@
                 <a16:creationId xmlns:a16="http://schemas.microsoft.com/office/drawing/2014/main" id="{1A882A9F-F4E9-4E23-8F0B-20B5DF42EAA9}"/>
               </a:ext>
               <a:ext uri="{C183D7F6-B498-43B3-948B-1728B52AA6E4}">
-                <adec:decorative xmlns:adec="http://schemas.microsoft.com/office/drawing/2017/decorative" val="1"/>
+                <adec:decorative xmlns:adec="http://schemas.microsoft.com/office/drawing/2017/decorative" xmlns="" val="1"/>
               </a:ext>
             </a:extLst>
           </p:cNvPr>
@@ -5027,7 +4533,7 @@
                 <a16:creationId xmlns:a16="http://schemas.microsoft.com/office/drawing/2014/main" id="{FBE9F90C-C163-435B-9A68-D15C92D1CF2B}"/>
               </a:ext>
               <a:ext uri="{C183D7F6-B498-43B3-948B-1728B52AA6E4}">
-                <adec:decorative xmlns:adec="http://schemas.microsoft.com/office/drawing/2017/decorative" val="1"/>
+                <adec:decorative xmlns:adec="http://schemas.microsoft.com/office/drawing/2017/decorative" xmlns="" val="1"/>
               </a:ext>
             </a:extLst>
           </p:cNvPr>
@@ -5121,7 +4627,7 @@
                 <a16:creationId xmlns:a16="http://schemas.microsoft.com/office/drawing/2014/main" id="{CDA1A2E9-63FE-408D-A803-8E306ECAB4B3}"/>
               </a:ext>
               <a:ext uri="{C183D7F6-B498-43B3-948B-1728B52AA6E4}">
-                <adec:decorative xmlns:adec="http://schemas.microsoft.com/office/drawing/2017/decorative" val="1"/>
+                <adec:decorative xmlns:adec="http://schemas.microsoft.com/office/drawing/2017/decorative" xmlns="" val="1"/>
               </a:ext>
             </a:extLst>
           </p:cNvPr>
@@ -5347,7 +4853,7 @@
                 <a14:useLocalDpi xmlns:a14="http://schemas.microsoft.com/office/drawing/2010/main" val="0"/>
               </a:ext>
               <a:ext uri="{96DAC541-7B7A-43D3-8B79-37D633B846F1}">
-                <asvg:svgBlip xmlns:asvg="http://schemas.microsoft.com/office/drawing/2016/SVG/main" r:embed="rId3"/>
+                <asvg:svgBlip xmlns:asvg="http://schemas.microsoft.com/office/drawing/2016/SVG/main" xmlns="" r:embed="rId3"/>
               </a:ext>
             </a:extLst>
           </a:blip>
@@ -5508,7 +5014,7 @@
                 <a16:creationId xmlns:a16="http://schemas.microsoft.com/office/drawing/2014/main" id="{F98ED85F-DCEE-4B50-802E-71A6E3E12B04}"/>
               </a:ext>
               <a:ext uri="{C183D7F6-B498-43B3-948B-1728B52AA6E4}">
-                <adec:decorative xmlns:adec="http://schemas.microsoft.com/office/drawing/2017/decorative" val="1"/>
+                <adec:decorative xmlns:adec="http://schemas.microsoft.com/office/drawing/2017/decorative" xmlns="" val="1"/>
               </a:ext>
             </a:extLst>
           </p:cNvPr>
@@ -5875,114 +5381,6 @@
           <p:cNvPr id="2" name="Title 1">
             <a:extLst>
               <a:ext uri="{FF2B5EF4-FFF2-40B4-BE49-F238E27FC236}">
-                <a16:creationId xmlns:a16="http://schemas.microsoft.com/office/drawing/2014/main" id="{C062EA12-E0C2-4DC6-B310-19B09D0A661A}"/>
-              </a:ext>
-            </a:extLst>
-          </p:cNvPr>
-          <p:cNvSpPr>
-            <a:spLocks noGrp="1"/>
-          </p:cNvSpPr>
-          <p:nvPr>
-            <p:ph type="title"/>
-          </p:nvPr>
-        </p:nvSpPr>
-        <p:spPr/>
-        <p:txBody>
-          <a:bodyPr/>
-          <a:lstStyle/>
-          <a:p>
-            <a:r>
-              <a:rPr lang="en-US" dirty="0"/>
-              <a:t>Course Content</a:t>
-            </a:r>
-          </a:p>
-        </p:txBody>
-      </p:sp>
-      <p:sp>
-        <p:nvSpPr>
-          <p:cNvPr id="3" name="Content Placeholder 2">
-            <a:extLst>
-              <a:ext uri="{FF2B5EF4-FFF2-40B4-BE49-F238E27FC236}">
-                <a16:creationId xmlns:a16="http://schemas.microsoft.com/office/drawing/2014/main" id="{D89330D7-9CFB-40C8-8930-A8E019340CED}"/>
-              </a:ext>
-            </a:extLst>
-          </p:cNvPr>
-          <p:cNvSpPr>
-            <a:spLocks noGrp="1"/>
-          </p:cNvSpPr>
-          <p:nvPr>
-            <p:ph idx="1"/>
-          </p:nvPr>
-        </p:nvSpPr>
-        <p:spPr/>
-        <p:txBody>
-          <a:bodyPr/>
-          <a:lstStyle/>
-          <a:p>
-            <a:r>
-              <a:rPr lang="en-US" dirty="0" err="1"/>
-              <a:t>Dfhkalsjdf</a:t>
-            </a:r>
-            <a:endParaRPr lang="en-US" dirty="0"/>
-          </a:p>
-          <a:p>
-            <a:r>
-              <a:rPr lang="en-US" dirty="0" err="1"/>
-              <a:t>Asdf</a:t>
-            </a:r>
-            <a:endParaRPr lang="en-US" dirty="0"/>
-          </a:p>
-          <a:p>
-            <a:r>
-              <a:rPr lang="en-US" dirty="0" err="1"/>
-              <a:t>Fasdhfsad</a:t>
-            </a:r>
-            <a:endParaRPr lang="en-US" dirty="0"/>
-          </a:p>
-          <a:p>
-            <a:r>
-              <a:rPr lang="en-US" dirty="0" err="1"/>
-              <a:t>sadf</a:t>
-            </a:r>
-            <a:endParaRPr lang="en-US" dirty="0"/>
-          </a:p>
-        </p:txBody>
-      </p:sp>
-    </p:spTree>
-    <p:extLst>
-      <p:ext uri="{BB962C8B-B14F-4D97-AF65-F5344CB8AC3E}">
-        <p14:creationId xmlns:p14="http://schemas.microsoft.com/office/powerpoint/2010/main" val="4059980719"/>
-      </p:ext>
-    </p:extLst>
-  </p:cSld>
-  <p:clrMapOvr>
-    <a:masterClrMapping/>
-  </p:clrMapOvr>
-</p:sld>
-</file>
-
-<file path=ppt/slides/slide6.xml><?xml version="1.0" encoding="utf-8"?>
-<p:sld xmlns:a="http://schemas.openxmlformats.org/drawingml/2006/main" xmlns:r="http://schemas.openxmlformats.org/officeDocument/2006/relationships" xmlns:p="http://schemas.openxmlformats.org/presentationml/2006/main">
-  <p:cSld>
-    <p:spTree>
-      <p:nvGrpSpPr>
-        <p:cNvPr id="1" name=""/>
-        <p:cNvGrpSpPr/>
-        <p:nvPr/>
-      </p:nvGrpSpPr>
-      <p:grpSpPr>
-        <a:xfrm>
-          <a:off x="0" y="0"/>
-          <a:ext cx="0" cy="0"/>
-          <a:chOff x="0" y="0"/>
-          <a:chExt cx="0" cy="0"/>
-        </a:xfrm>
-      </p:grpSpPr>
-      <p:sp>
-        <p:nvSpPr>
-          <p:cNvPr id="2" name="Title 1">
-            <a:extLst>
-              <a:ext uri="{FF2B5EF4-FFF2-40B4-BE49-F238E27FC236}">
                 <a16:creationId xmlns:a16="http://schemas.microsoft.com/office/drawing/2014/main" id="{BF0A9959-AFDF-49B5-AF2E-B049EED99FE8}"/>
               </a:ext>
             </a:extLst>
@@ -6057,7 +5455,7 @@
 </p:sld>
 </file>
 
-<file path=ppt/slides/slide7.xml><?xml version="1.0" encoding="utf-8"?>
+<file path=ppt/slides/slide6.xml><?xml version="1.0" encoding="utf-8"?>
 <p:sld xmlns:a="http://schemas.openxmlformats.org/drawingml/2006/main" xmlns:r="http://schemas.openxmlformats.org/officeDocument/2006/relationships" xmlns:p="http://schemas.openxmlformats.org/presentationml/2006/main">
   <p:cSld>
     <p:spTree>
@@ -6198,7 +5596,7 @@
 </p:sld>
 </file>
 
-<file path=ppt/slides/slide8.xml><?xml version="1.0" encoding="utf-8"?>
+<file path=ppt/slides/slide7.xml><?xml version="1.0" encoding="utf-8"?>
 <p:sld xmlns:a="http://schemas.openxmlformats.org/drawingml/2006/main" xmlns:r="http://schemas.openxmlformats.org/officeDocument/2006/relationships" xmlns:p="http://schemas.openxmlformats.org/presentationml/2006/main">
   <p:cSld>
     <p:bg>
@@ -6231,7 +5629,7 @@
                 <a16:creationId xmlns:a16="http://schemas.microsoft.com/office/drawing/2014/main" id="{C66F2F30-5DC0-44A0-BFA6-E12F46ED16DA}"/>
               </a:ext>
               <a:ext uri="{C183D7F6-B498-43B3-948B-1728B52AA6E4}">
-                <adec:decorative xmlns:adec="http://schemas.microsoft.com/office/drawing/2017/decorative" val="1"/>
+                <adec:decorative xmlns:adec="http://schemas.microsoft.com/office/drawing/2017/decorative" xmlns="" val="1"/>
               </a:ext>
             </a:extLst>
           </p:cNvPr>
@@ -6355,7 +5753,7 @@
                 <a16:creationId xmlns:a16="http://schemas.microsoft.com/office/drawing/2014/main" id="{85872F57-7F42-4F97-8391-DDC8D0054C03}"/>
               </a:ext>
               <a:ext uri="{C183D7F6-B498-43B3-948B-1728B52AA6E4}">
-                <adec:decorative xmlns:adec="http://schemas.microsoft.com/office/drawing/2017/decorative" val="1"/>
+                <adec:decorative xmlns:adec="http://schemas.microsoft.com/office/drawing/2017/decorative" xmlns="" val="1"/>
               </a:ext>
             </a:extLst>
           </p:cNvPr>
@@ -6511,7 +5909,7 @@
                 <a16:creationId xmlns:a16="http://schemas.microsoft.com/office/drawing/2014/main" id="{04DC2037-48A0-4F22-B9D4-8EAEBC780AB4}"/>
               </a:ext>
               <a:ext uri="{C183D7F6-B498-43B3-948B-1728B52AA6E4}">
-                <adec:decorative xmlns:adec="http://schemas.microsoft.com/office/drawing/2017/decorative" val="1"/>
+                <adec:decorative xmlns:adec="http://schemas.microsoft.com/office/drawing/2017/decorative" xmlns="" val="1"/>
               </a:ext>
             </a:extLst>
           </p:cNvPr>
@@ -6616,7 +6014,7 @@
                 <a16:creationId xmlns:a16="http://schemas.microsoft.com/office/drawing/2014/main" id="{0006CBFD-ADA0-43D1-9332-9C34CA1C76ED}"/>
               </a:ext>
               <a:ext uri="{C183D7F6-B498-43B3-948B-1728B52AA6E4}">
-                <adec:decorative xmlns:adec="http://schemas.microsoft.com/office/drawing/2017/decorative" val="1"/>
+                <adec:decorative xmlns:adec="http://schemas.microsoft.com/office/drawing/2017/decorative" xmlns="" val="1"/>
               </a:ext>
             </a:extLst>
           </p:cNvPr>
@@ -6724,7 +6122,7 @@
                 <a16:creationId xmlns:a16="http://schemas.microsoft.com/office/drawing/2014/main" id="{2B931666-F28F-45F3-A074-66D2272D580B}"/>
               </a:ext>
               <a:ext uri="{C183D7F6-B498-43B3-948B-1728B52AA6E4}">
-                <adec:decorative xmlns:adec="http://schemas.microsoft.com/office/drawing/2017/decorative" val="1"/>
+                <adec:decorative xmlns:adec="http://schemas.microsoft.com/office/drawing/2017/decorative" xmlns="" val="1"/>
               </a:ext>
             </a:extLst>
           </p:cNvPr>
@@ -6940,7 +6338,7 @@
 </p:sld>
 </file>
 
-<file path=ppt/slides/slide9.xml><?xml version="1.0" encoding="utf-8"?>
+<file path=ppt/slides/slide8.xml><?xml version="1.0" encoding="utf-8"?>
 <p:sld xmlns:a="http://schemas.openxmlformats.org/drawingml/2006/main" xmlns:r="http://schemas.openxmlformats.org/officeDocument/2006/relationships" xmlns:p="http://schemas.openxmlformats.org/presentationml/2006/main">
   <p:cSld>
     <p:spTree>
@@ -7072,6 +6470,498 @@
     <p:extLst>
       <p:ext uri="{BB962C8B-B14F-4D97-AF65-F5344CB8AC3E}">
         <p14:creationId xmlns:p14="http://schemas.microsoft.com/office/powerpoint/2010/main" val="84990408"/>
+      </p:ext>
+    </p:extLst>
+  </p:cSld>
+  <p:clrMapOvr>
+    <a:masterClrMapping/>
+  </p:clrMapOvr>
+</p:sld>
+</file>
+
+<file path=ppt/slides/slide9.xml><?xml version="1.0" encoding="utf-8"?>
+<p:sld xmlns:a="http://schemas.openxmlformats.org/drawingml/2006/main" xmlns:r="http://schemas.openxmlformats.org/officeDocument/2006/relationships" xmlns:p="http://schemas.openxmlformats.org/presentationml/2006/main">
+  <p:cSld>
+    <p:bg>
+      <p:bgPr>
+        <a:solidFill>
+          <a:schemeClr val="bg1"/>
+        </a:solidFill>
+        <a:effectLst/>
+      </p:bgPr>
+    </p:bg>
+    <p:spTree>
+      <p:nvGrpSpPr>
+        <p:cNvPr id="1" name=""/>
+        <p:cNvGrpSpPr/>
+        <p:nvPr/>
+      </p:nvGrpSpPr>
+      <p:grpSpPr>
+        <a:xfrm>
+          <a:off x="0" y="0"/>
+          <a:ext cx="0" cy="0"/>
+          <a:chOff x="0" y="0"/>
+          <a:chExt cx="0" cy="0"/>
+        </a:xfrm>
+      </p:grpSpPr>
+      <p:pic>
+        <p:nvPicPr>
+          <p:cNvPr id="16" name="Graphic 6">
+            <a:extLst>
+              <a:ext uri="{FF2B5EF4-FFF2-40B4-BE49-F238E27FC236}">
+                <a16:creationId xmlns:a16="http://schemas.microsoft.com/office/drawing/2014/main" id="{1AC97B56-0A17-4E09-BF93-240A658CD4B6}"/>
+              </a:ext>
+            </a:extLst>
+          </p:cNvPr>
+          <p:cNvPicPr>
+            <a:picLocks noChangeAspect="1"/>
+          </p:cNvPicPr>
+          <p:nvPr/>
+        </p:nvPicPr>
+        <p:blipFill>
+          <a:blip r:embed="rId3">
+            <a:extLst>
+              <a:ext uri="{28A0092B-C50C-407E-A947-70E740481C1C}">
+                <a14:useLocalDpi xmlns:a14="http://schemas.microsoft.com/office/drawing/2010/main" val="0"/>
+              </a:ext>
+              <a:ext uri="{96DAC541-7B7A-43D3-8B79-37D633B846F1}">
+                <asvg:svgBlip xmlns:asvg="http://schemas.microsoft.com/office/drawing/2016/SVG/main" xmlns="" r:embed="rId4"/>
+              </a:ext>
+            </a:extLst>
+          </a:blip>
+          <a:stretch>
+            <a:fillRect/>
+          </a:stretch>
+        </p:blipFill>
+        <p:spPr>
+          <a:xfrm>
+            <a:off x="7571572" y="4648201"/>
+            <a:ext cx="1632648" cy="1632648"/>
+          </a:xfrm>
+          <a:prstGeom prst="rect">
+            <a:avLst/>
+          </a:prstGeom>
+        </p:spPr>
+      </p:pic>
+      <p:sp>
+        <p:nvSpPr>
+          <p:cNvPr id="17" name="Rectangle 9">
+            <a:extLst>
+              <a:ext uri="{FF2B5EF4-FFF2-40B4-BE49-F238E27FC236}">
+                <a16:creationId xmlns:a16="http://schemas.microsoft.com/office/drawing/2014/main" id="{1A882A9F-F4E9-4E23-8F0B-20B5DF42EAA9}"/>
+              </a:ext>
+              <a:ext uri="{C183D7F6-B498-43B3-948B-1728B52AA6E4}">
+                <adec:decorative xmlns:adec="http://schemas.microsoft.com/office/drawing/2017/decorative" xmlns="" val="1"/>
+              </a:ext>
+            </a:extLst>
+          </p:cNvPr>
+          <p:cNvSpPr>
+            <a:spLocks noGrp="1" noRot="1" noChangeAspect="1" noMove="1" noResize="1" noEditPoints="1" noAdjustHandles="1" noChangeArrowheads="1" noChangeShapeType="1" noTextEdit="1"/>
+          </p:cNvSpPr>
+          <p:nvPr>
+            <p:extLst>
+              <p:ext uri="{386F3935-93C4-4BCD-93E2-E3B085C9AB24}">
+                <p16:designElem xmlns:p16="http://schemas.microsoft.com/office/powerpoint/2015/main" val="1"/>
+              </p:ext>
+            </p:extLst>
+          </p:nvPr>
+        </p:nvSpPr>
+        <p:spPr>
+          <a:xfrm>
+            <a:off x="9619345" y="4521270"/>
+            <a:ext cx="2115455" cy="1890204"/>
+          </a:xfrm>
+          <a:prstGeom prst="rect">
+            <a:avLst/>
+          </a:prstGeom>
+          <a:solidFill>
+            <a:schemeClr val="accent1">
+              <a:alpha val="95000"/>
+            </a:schemeClr>
+          </a:solidFill>
+          <a:ln w="25400">
+            <a:noFill/>
+          </a:ln>
+        </p:spPr>
+        <p:style>
+          <a:lnRef idx="2">
+            <a:schemeClr val="accent1">
+              <a:shade val="50000"/>
+            </a:schemeClr>
+          </a:lnRef>
+          <a:fillRef idx="1">
+            <a:schemeClr val="accent1"/>
+          </a:fillRef>
+          <a:effectRef idx="0">
+            <a:schemeClr val="accent1"/>
+          </a:effectRef>
+          <a:fontRef idx="minor">
+            <a:schemeClr val="lt1"/>
+          </a:fontRef>
+        </p:style>
+        <p:txBody>
+          <a:bodyPr rtlCol="0" anchor="ctr"/>
+          <a:lstStyle/>
+          <a:p>
+            <a:pPr marL="0" marR="0" lvl="0" indent="0" algn="ctr" defTabSz="914400" rtl="0" eaLnBrk="1" fontAlgn="auto" latinLnBrk="0" hangingPunct="1">
+              <a:lnSpc>
+                <a:spcPct val="100000"/>
+              </a:lnSpc>
+              <a:spcBef>
+                <a:spcPts val="0"/>
+              </a:spcBef>
+              <a:spcAft>
+                <a:spcPts val="0"/>
+              </a:spcAft>
+              <a:buClrTx/>
+              <a:buSzTx/>
+              <a:buFontTx/>
+              <a:buNone/>
+              <a:tabLst/>
+              <a:defRPr/>
+            </a:pPr>
+            <a:endParaRPr kumimoji="0" lang="en-US" sz="1800" b="0" i="0" u="none" strike="noStrike" kern="1200" cap="none" spc="0" normalizeH="0" baseline="0" noProof="0">
+              <a:ln>
+                <a:noFill/>
+              </a:ln>
+              <a:solidFill>
+                <a:srgbClr val="FFFFFF"/>
+              </a:solidFill>
+              <a:effectLst/>
+              <a:uLnTx/>
+              <a:uFillTx/>
+              <a:latin typeface="Calibri" panose="020F0502020204030204"/>
+              <a:ea typeface="+mn-ea"/>
+              <a:cs typeface="+mn-cs"/>
+            </a:endParaRPr>
+          </a:p>
+        </p:txBody>
+      </p:sp>
+      <p:sp>
+        <p:nvSpPr>
+          <p:cNvPr id="18" name="Rectangle 11">
+            <a:extLst>
+              <a:ext uri="{FF2B5EF4-FFF2-40B4-BE49-F238E27FC236}">
+                <a16:creationId xmlns:a16="http://schemas.microsoft.com/office/drawing/2014/main" id="{FBE9F90C-C163-435B-9A68-D15C92D1CF2B}"/>
+              </a:ext>
+              <a:ext uri="{C183D7F6-B498-43B3-948B-1728B52AA6E4}">
+                <adec:decorative xmlns:adec="http://schemas.microsoft.com/office/drawing/2017/decorative" xmlns="" val="1"/>
+              </a:ext>
+            </a:extLst>
+          </p:cNvPr>
+          <p:cNvSpPr>
+            <a:spLocks noGrp="1" noRot="1" noChangeAspect="1" noMove="1" noResize="1" noEditPoints="1" noAdjustHandles="1" noChangeArrowheads="1" noChangeShapeType="1" noTextEdit="1"/>
+          </p:cNvSpPr>
+          <p:nvPr>
+            <p:extLst>
+              <p:ext uri="{386F3935-93C4-4BCD-93E2-E3B085C9AB24}">
+                <p16:designElem xmlns:p16="http://schemas.microsoft.com/office/powerpoint/2015/main" val="1"/>
+              </p:ext>
+            </p:extLst>
+          </p:nvPr>
+        </p:nvSpPr>
+        <p:spPr>
+          <a:xfrm>
+            <a:off x="457200" y="4521269"/>
+            <a:ext cx="6699246" cy="1877811"/>
+          </a:xfrm>
+          <a:prstGeom prst="rect">
+            <a:avLst/>
+          </a:prstGeom>
+          <a:solidFill>
+            <a:srgbClr val="A5A5A5">
+              <a:alpha val="80000"/>
+            </a:srgbClr>
+          </a:solidFill>
+          <a:ln w="25400">
+            <a:noFill/>
+          </a:ln>
+        </p:spPr>
+        <p:style>
+          <a:lnRef idx="2">
+            <a:schemeClr val="accent1">
+              <a:shade val="50000"/>
+            </a:schemeClr>
+          </a:lnRef>
+          <a:fillRef idx="1">
+            <a:schemeClr val="accent1"/>
+          </a:fillRef>
+          <a:effectRef idx="0">
+            <a:schemeClr val="accent1"/>
+          </a:effectRef>
+          <a:fontRef idx="minor">
+            <a:schemeClr val="lt1"/>
+          </a:fontRef>
+        </p:style>
+        <p:txBody>
+          <a:bodyPr rtlCol="0" anchor="ctr"/>
+          <a:lstStyle/>
+          <a:p>
+            <a:pPr marL="0" marR="0" lvl="0" indent="0" algn="ctr" defTabSz="914400" rtl="0" eaLnBrk="1" fontAlgn="auto" latinLnBrk="0" hangingPunct="1">
+              <a:lnSpc>
+                <a:spcPct val="100000"/>
+              </a:lnSpc>
+              <a:spcBef>
+                <a:spcPts val="0"/>
+              </a:spcBef>
+              <a:spcAft>
+                <a:spcPts val="0"/>
+              </a:spcAft>
+              <a:buClrTx/>
+              <a:buSzTx/>
+              <a:buFontTx/>
+              <a:buNone/>
+              <a:tabLst/>
+              <a:defRPr/>
+            </a:pPr>
+            <a:endParaRPr kumimoji="0" lang="en-US" sz="1800" b="0" i="0" u="none" strike="noStrike" kern="1200" cap="none" spc="0" normalizeH="0" baseline="0" noProof="0">
+              <a:ln>
+                <a:noFill/>
+              </a:ln>
+              <a:solidFill>
+                <a:srgbClr val="FFFFFF"/>
+              </a:solidFill>
+              <a:effectLst/>
+              <a:uLnTx/>
+              <a:uFillTx/>
+              <a:latin typeface="Calibri" panose="020F0502020204030204"/>
+              <a:ea typeface="+mn-ea"/>
+              <a:cs typeface="+mn-cs"/>
+            </a:endParaRPr>
+          </a:p>
+        </p:txBody>
+      </p:sp>
+      <p:sp>
+        <p:nvSpPr>
+          <p:cNvPr id="19" name="Rectangle 13">
+            <a:extLst>
+              <a:ext uri="{FF2B5EF4-FFF2-40B4-BE49-F238E27FC236}">
+                <a16:creationId xmlns:a16="http://schemas.microsoft.com/office/drawing/2014/main" id="{CDA1A2E9-63FE-408D-A803-8E306ECAB4B3}"/>
+              </a:ext>
+              <a:ext uri="{C183D7F6-B498-43B3-948B-1728B52AA6E4}">
+                <adec:decorative xmlns:adec="http://schemas.microsoft.com/office/drawing/2017/decorative" xmlns="" val="1"/>
+              </a:ext>
+            </a:extLst>
+          </p:cNvPr>
+          <p:cNvSpPr>
+            <a:spLocks noGrp="1" noRot="1" noChangeAspect="1" noMove="1" noResize="1" noEditPoints="1" noAdjustHandles="1" noChangeArrowheads="1" noChangeShapeType="1" noTextEdit="1"/>
+          </p:cNvSpPr>
+          <p:nvPr>
+            <p:extLst>
+              <p:ext uri="{386F3935-93C4-4BCD-93E2-E3B085C9AB24}">
+                <p16:designElem xmlns:p16="http://schemas.microsoft.com/office/powerpoint/2015/main" val="1"/>
+              </p:ext>
+            </p:extLst>
+          </p:nvPr>
+        </p:nvSpPr>
+        <p:spPr>
+          <a:xfrm>
+            <a:off x="462058" y="450221"/>
+            <a:ext cx="11272742" cy="3918123"/>
+          </a:xfrm>
+          <a:prstGeom prst="rect">
+            <a:avLst/>
+          </a:prstGeom>
+          <a:solidFill>
+            <a:srgbClr val="404040">
+              <a:alpha val="95000"/>
+            </a:srgbClr>
+          </a:solidFill>
+          <a:ln w="25400">
+            <a:noFill/>
+          </a:ln>
+        </p:spPr>
+        <p:style>
+          <a:lnRef idx="2">
+            <a:schemeClr val="accent1">
+              <a:shade val="50000"/>
+            </a:schemeClr>
+          </a:lnRef>
+          <a:fillRef idx="1">
+            <a:schemeClr val="accent1"/>
+          </a:fillRef>
+          <a:effectRef idx="0">
+            <a:schemeClr val="accent1"/>
+          </a:effectRef>
+          <a:fontRef idx="minor">
+            <a:schemeClr val="lt1"/>
+          </a:fontRef>
+        </p:style>
+        <p:txBody>
+          <a:bodyPr rtlCol="0" anchor="ctr"/>
+          <a:lstStyle/>
+          <a:p>
+            <a:pPr marL="0" marR="0" lvl="0" indent="0" algn="ctr" defTabSz="914400" rtl="0" eaLnBrk="1" fontAlgn="auto" latinLnBrk="0" hangingPunct="1">
+              <a:lnSpc>
+                <a:spcPct val="100000"/>
+              </a:lnSpc>
+              <a:spcBef>
+                <a:spcPts val="0"/>
+              </a:spcBef>
+              <a:spcAft>
+                <a:spcPts val="0"/>
+              </a:spcAft>
+              <a:buClrTx/>
+              <a:buSzTx/>
+              <a:buFontTx/>
+              <a:buNone/>
+              <a:tabLst/>
+              <a:defRPr/>
+            </a:pPr>
+            <a:endParaRPr kumimoji="0" lang="en-US" sz="1800" b="0" i="0" u="none" strike="noStrike" kern="1200" cap="none" spc="0" normalizeH="0" baseline="0" noProof="0">
+              <a:ln>
+                <a:noFill/>
+              </a:ln>
+              <a:solidFill>
+                <a:srgbClr val="404040"/>
+              </a:solidFill>
+              <a:effectLst/>
+              <a:uLnTx/>
+              <a:uFillTx/>
+              <a:latin typeface="Calibri" panose="020F0502020204030204"/>
+              <a:ea typeface="+mn-ea"/>
+              <a:cs typeface="+mn-cs"/>
+            </a:endParaRPr>
+          </a:p>
+        </p:txBody>
+      </p:sp>
+      <p:sp>
+        <p:nvSpPr>
+          <p:cNvPr id="2" name="Title 1">
+            <a:extLst>
+              <a:ext uri="{FF2B5EF4-FFF2-40B4-BE49-F238E27FC236}">
+                <a16:creationId xmlns:a16="http://schemas.microsoft.com/office/drawing/2014/main" id="{DF8C2470-B33F-489C-85D3-DB9DBD5FD510}"/>
+              </a:ext>
+            </a:extLst>
+          </p:cNvPr>
+          <p:cNvSpPr>
+            <a:spLocks noGrp="1"/>
+          </p:cNvSpPr>
+          <p:nvPr>
+            <p:ph type="title"/>
+          </p:nvPr>
+        </p:nvSpPr>
+        <p:spPr>
+          <a:xfrm>
+            <a:off x="1100669" y="1111086"/>
+            <a:ext cx="10011831" cy="2623885"/>
+          </a:xfrm>
+        </p:spPr>
+        <p:txBody>
+          <a:bodyPr vert="horz" lIns="91440" tIns="45720" rIns="91440" bIns="45720" rtlCol="0" anchor="ctr">
+            <a:normAutofit/>
+          </a:bodyPr>
+          <a:lstStyle/>
+          <a:p>
+            <a:r>
+              <a:rPr lang="en-US" sz="6000" kern="1200" dirty="0">
+                <a:solidFill>
+                  <a:srgbClr val="FFFFFF"/>
+                </a:solidFill>
+                <a:latin typeface="+mj-lt"/>
+                <a:ea typeface="+mj-ea"/>
+                <a:cs typeface="+mj-cs"/>
+              </a:rPr>
+              <a:t>Your To-Do List</a:t>
+            </a:r>
+          </a:p>
+        </p:txBody>
+      </p:sp>
+      <p:sp>
+        <p:nvSpPr>
+          <p:cNvPr id="3" name="Content Placeholder 2">
+            <a:extLst>
+              <a:ext uri="{FF2B5EF4-FFF2-40B4-BE49-F238E27FC236}">
+                <a16:creationId xmlns:a16="http://schemas.microsoft.com/office/drawing/2014/main" id="{A0438F36-24BA-4093-B476-DCD76C10362F}"/>
+              </a:ext>
+            </a:extLst>
+          </p:cNvPr>
+          <p:cNvSpPr>
+            <a:spLocks noGrp="1"/>
+          </p:cNvSpPr>
+          <p:nvPr>
+            <p:ph idx="1"/>
+          </p:nvPr>
+        </p:nvSpPr>
+        <p:spPr>
+          <a:xfrm>
+            <a:off x="1079500" y="4843002"/>
+            <a:ext cx="5433479" cy="1234345"/>
+          </a:xfrm>
+        </p:spPr>
+        <p:txBody>
+          <a:bodyPr vert="horz" lIns="91440" tIns="45720" rIns="91440" bIns="45720" rtlCol="0" anchor="ctr">
+            <a:normAutofit/>
+          </a:bodyPr>
+          <a:lstStyle/>
+          <a:p>
+            <a:pPr marL="0" indent="0">
+              <a:buNone/>
+            </a:pPr>
+            <a:r>
+              <a:rPr lang="en-US" sz="2400" kern="1200">
+                <a:solidFill>
+                  <a:srgbClr val="1B1B1B"/>
+                </a:solidFill>
+                <a:latin typeface="+mn-lt"/>
+                <a:ea typeface="+mn-ea"/>
+                <a:cs typeface="+mn-cs"/>
+              </a:rPr>
+              <a:t>What to work on for next class</a:t>
+            </a:r>
+          </a:p>
+        </p:txBody>
+      </p:sp>
+      <p:sp>
+        <p:nvSpPr>
+          <p:cNvPr id="4" name="Rectangle 3">
+            <a:extLst>
+              <a:ext uri="{FF2B5EF4-FFF2-40B4-BE49-F238E27FC236}">
+                <a16:creationId xmlns:a16="http://schemas.microsoft.com/office/drawing/2014/main" id="{1207E67E-7394-4606-A6DF-DA68FC43D951}"/>
+              </a:ext>
+            </a:extLst>
+          </p:cNvPr>
+          <p:cNvSpPr/>
+          <p:nvPr/>
+        </p:nvSpPr>
+        <p:spPr>
+          <a:xfrm>
+            <a:off x="9619345" y="4521269"/>
+            <a:ext cx="2115455" cy="1886510"/>
+          </a:xfrm>
+          <a:prstGeom prst="rect">
+            <a:avLst/>
+          </a:prstGeom>
+        </p:spPr>
+        <p:style>
+          <a:lnRef idx="2">
+            <a:schemeClr val="accent6">
+              <a:shade val="50000"/>
+            </a:schemeClr>
+          </a:lnRef>
+          <a:fillRef idx="1">
+            <a:schemeClr val="accent6"/>
+          </a:fillRef>
+          <a:effectRef idx="0">
+            <a:schemeClr val="accent6"/>
+          </a:effectRef>
+          <a:fontRef idx="minor">
+            <a:schemeClr val="lt1"/>
+          </a:fontRef>
+        </p:style>
+        <p:txBody>
+          <a:bodyPr rtlCol="0" anchor="ctr"/>
+          <a:lstStyle/>
+          <a:p>
+            <a:pPr algn="ctr"/>
+            <a:endParaRPr lang="en-US"/>
+          </a:p>
+        </p:txBody>
+      </p:sp>
+    </p:spTree>
+    <p:extLst>
+      <p:ext uri="{BB962C8B-B14F-4D97-AF65-F5344CB8AC3E}">
+        <p14:creationId xmlns:p14="http://schemas.microsoft.com/office/powerpoint/2010/main" val="4223807422"/>
       </p:ext>
     </p:extLst>
   </p:cSld>

</xml_diff>